<commit_message>
remained from last commit
</commit_message>
<xml_diff>
--- a/session1/Version Control.pptx
+++ b/session1/Version Control.pptx
@@ -254,7 +254,7 @@
           </a:lstStyle>
           <a:p>
             <a:r>
-              <a:rPr lang="en-US" smtClean="0"/>
+              <a:rPr lang="en-US"/>
               <a:t>Click to edit Master title style</a:t>
             </a:r>
             <a:endParaRPr lang="en-US" dirty="0"/>
@@ -326,7 +326,7 @@
           </a:lstStyle>
           <a:p>
             <a:r>
-              <a:rPr lang="en-US" smtClean="0"/>
+              <a:rPr lang="en-US"/>
               <a:t>Click to edit Master subtitle style</a:t>
             </a:r>
             <a:endParaRPr lang="en-US" dirty="0"/>
@@ -350,7 +350,7 @@
           <a:p>
             <a:fld id="{96DFF08F-DC6B-4601-B491-B0F83F6DD2DA}" type="datetimeFigureOut">
               <a:rPr lang="en-US" dirty="0"/>
-              <a:t>3/5/2019</a:t>
+              <a:t>3/6/2019</a:t>
             </a:fld>
             <a:endParaRPr lang="en-US" dirty="0"/>
           </a:p>
@@ -477,7 +477,7 @@
           <a:lstStyle/>
           <a:p>
             <a:r>
-              <a:rPr lang="en-US" smtClean="0"/>
+              <a:rPr lang="en-US"/>
               <a:t>Click to edit Master title style</a:t>
             </a:r>
             <a:endParaRPr lang="en-US" dirty="0"/>
@@ -501,35 +501,35 @@
           <a:p>
             <a:pPr lvl="0"/>
             <a:r>
-              <a:rPr lang="en-US" smtClean="0"/>
+              <a:rPr lang="en-US"/>
               <a:t>Edit Master text styles</a:t>
             </a:r>
           </a:p>
           <a:p>
             <a:pPr lvl="1"/>
             <a:r>
-              <a:rPr lang="en-US" smtClean="0"/>
+              <a:rPr lang="en-US"/>
               <a:t>Second level</a:t>
             </a:r>
           </a:p>
           <a:p>
             <a:pPr lvl="2"/>
             <a:r>
-              <a:rPr lang="en-US" smtClean="0"/>
+              <a:rPr lang="en-US"/>
               <a:t>Third level</a:t>
             </a:r>
           </a:p>
           <a:p>
             <a:pPr lvl="3"/>
             <a:r>
-              <a:rPr lang="en-US" smtClean="0"/>
+              <a:rPr lang="en-US"/>
               <a:t>Fourth level</a:t>
             </a:r>
           </a:p>
           <a:p>
             <a:pPr lvl="4"/>
             <a:r>
-              <a:rPr lang="en-US" smtClean="0"/>
+              <a:rPr lang="en-US"/>
               <a:t>Fifth level</a:t>
             </a:r>
             <a:endParaRPr lang="en-US" dirty="0"/>
@@ -553,7 +553,7 @@
           <a:p>
             <a:fld id="{96DFF08F-DC6B-4601-B491-B0F83F6DD2DA}" type="datetimeFigureOut">
               <a:rPr lang="en-US" dirty="0"/>
-              <a:t>3/5/2019</a:t>
+              <a:t>3/6/2019</a:t>
             </a:fld>
             <a:endParaRPr lang="en-US" dirty="0"/>
           </a:p>
@@ -723,7 +723,7 @@
           <a:lstStyle/>
           <a:p>
             <a:r>
-              <a:rPr lang="en-US" smtClean="0"/>
+              <a:rPr lang="en-US"/>
               <a:t>Click to edit Master title style</a:t>
             </a:r>
             <a:endParaRPr lang="en-US" dirty="0"/>
@@ -752,35 +752,35 @@
           <a:p>
             <a:pPr lvl="0"/>
             <a:r>
-              <a:rPr lang="en-US" smtClean="0"/>
+              <a:rPr lang="en-US"/>
               <a:t>Edit Master text styles</a:t>
             </a:r>
           </a:p>
           <a:p>
             <a:pPr lvl="1"/>
             <a:r>
-              <a:rPr lang="en-US" smtClean="0"/>
+              <a:rPr lang="en-US"/>
               <a:t>Second level</a:t>
             </a:r>
           </a:p>
           <a:p>
             <a:pPr lvl="2"/>
             <a:r>
-              <a:rPr lang="en-US" smtClean="0"/>
+              <a:rPr lang="en-US"/>
               <a:t>Third level</a:t>
             </a:r>
           </a:p>
           <a:p>
             <a:pPr lvl="3"/>
             <a:r>
-              <a:rPr lang="en-US" smtClean="0"/>
+              <a:rPr lang="en-US"/>
               <a:t>Fourth level</a:t>
             </a:r>
           </a:p>
           <a:p>
             <a:pPr lvl="4"/>
             <a:r>
-              <a:rPr lang="en-US" smtClean="0"/>
+              <a:rPr lang="en-US"/>
               <a:t>Fifth level</a:t>
             </a:r>
             <a:endParaRPr lang="en-US" dirty="0"/>
@@ -804,7 +804,7 @@
           <a:p>
             <a:fld id="{96DFF08F-DC6B-4601-B491-B0F83F6DD2DA}" type="datetimeFigureOut">
               <a:rPr lang="en-US" dirty="0"/>
-              <a:t>3/5/2019</a:t>
+              <a:t>3/6/2019</a:t>
             </a:fld>
             <a:endParaRPr lang="en-US" dirty="0"/>
           </a:p>
@@ -893,7 +893,7 @@
           <a:lstStyle/>
           <a:p>
             <a:r>
-              <a:rPr lang="en-US" smtClean="0"/>
+              <a:rPr lang="en-US"/>
               <a:t>Click to edit Master title style</a:t>
             </a:r>
             <a:endParaRPr lang="en-US" dirty="0"/>
@@ -917,35 +917,35 @@
           <a:p>
             <a:pPr lvl="0"/>
             <a:r>
-              <a:rPr lang="en-US" smtClean="0"/>
+              <a:rPr lang="en-US"/>
               <a:t>Edit Master text styles</a:t>
             </a:r>
           </a:p>
           <a:p>
             <a:pPr lvl="1"/>
             <a:r>
-              <a:rPr lang="en-US" smtClean="0"/>
+              <a:rPr lang="en-US"/>
               <a:t>Second level</a:t>
             </a:r>
           </a:p>
           <a:p>
             <a:pPr lvl="2"/>
             <a:r>
-              <a:rPr lang="en-US" smtClean="0"/>
+              <a:rPr lang="en-US"/>
               <a:t>Third level</a:t>
             </a:r>
           </a:p>
           <a:p>
             <a:pPr lvl="3"/>
             <a:r>
-              <a:rPr lang="en-US" smtClean="0"/>
+              <a:rPr lang="en-US"/>
               <a:t>Fourth level</a:t>
             </a:r>
           </a:p>
           <a:p>
             <a:pPr lvl="4"/>
             <a:r>
-              <a:rPr lang="en-US" smtClean="0"/>
+              <a:rPr lang="en-US"/>
               <a:t>Fifth level</a:t>
             </a:r>
             <a:endParaRPr lang="en-US" dirty="0"/>
@@ -969,7 +969,7 @@
           <a:p>
             <a:fld id="{D62CEF3B-A037-46D0-B02C-1428F07E9383}" type="datetimeFigureOut">
               <a:rPr lang="en-US" dirty="0"/>
-              <a:t>3/5/2019</a:t>
+              <a:t>3/6/2019</a:t>
             </a:fld>
             <a:endParaRPr lang="en-US" dirty="0"/>
           </a:p>
@@ -1163,7 +1163,7 @@
           </a:lstStyle>
           <a:p>
             <a:r>
-              <a:rPr lang="en-US" smtClean="0"/>
+              <a:rPr lang="en-US"/>
               <a:t>Click to edit Master title style</a:t>
             </a:r>
             <a:endParaRPr lang="en-US" dirty="0"/>
@@ -1284,7 +1284,7 @@
           <a:p>
             <a:pPr lvl="0"/>
             <a:r>
-              <a:rPr lang="en-US" smtClean="0"/>
+              <a:rPr lang="en-US"/>
               <a:t>Edit Master text styles</a:t>
             </a:r>
           </a:p>
@@ -1307,7 +1307,7 @@
           <a:p>
             <a:fld id="{96DFF08F-DC6B-4601-B491-B0F83F6DD2DA}" type="datetimeFigureOut">
               <a:rPr lang="en-US" dirty="0"/>
-              <a:t>3/5/2019</a:t>
+              <a:t>3/6/2019</a:t>
             </a:fld>
             <a:endParaRPr lang="en-US" dirty="0"/>
           </a:p>
@@ -1439,7 +1439,7 @@
           <a:lstStyle/>
           <a:p>
             <a:r>
-              <a:rPr lang="en-US" smtClean="0"/>
+              <a:rPr lang="en-US"/>
               <a:t>Click to edit Master title style</a:t>
             </a:r>
             <a:endParaRPr lang="en-US" dirty="0"/>
@@ -1468,35 +1468,35 @@
           <a:p>
             <a:pPr lvl="0"/>
             <a:r>
-              <a:rPr lang="en-US" smtClean="0"/>
+              <a:rPr lang="en-US"/>
               <a:t>Edit Master text styles</a:t>
             </a:r>
           </a:p>
           <a:p>
             <a:pPr lvl="1"/>
             <a:r>
-              <a:rPr lang="en-US" smtClean="0"/>
+              <a:rPr lang="en-US"/>
               <a:t>Second level</a:t>
             </a:r>
           </a:p>
           <a:p>
             <a:pPr lvl="2"/>
             <a:r>
-              <a:rPr lang="en-US" smtClean="0"/>
+              <a:rPr lang="en-US"/>
               <a:t>Third level</a:t>
             </a:r>
           </a:p>
           <a:p>
             <a:pPr lvl="3"/>
             <a:r>
-              <a:rPr lang="en-US" smtClean="0"/>
+              <a:rPr lang="en-US"/>
               <a:t>Fourth level</a:t>
             </a:r>
           </a:p>
           <a:p>
             <a:pPr lvl="4"/>
             <a:r>
-              <a:rPr lang="en-US" smtClean="0"/>
+              <a:rPr lang="en-US"/>
               <a:t>Fifth level</a:t>
             </a:r>
             <a:endParaRPr lang="en-US" dirty="0"/>
@@ -1525,35 +1525,35 @@
           <a:p>
             <a:pPr lvl="0"/>
             <a:r>
-              <a:rPr lang="en-US" smtClean="0"/>
+              <a:rPr lang="en-US"/>
               <a:t>Edit Master text styles</a:t>
             </a:r>
           </a:p>
           <a:p>
             <a:pPr lvl="1"/>
             <a:r>
-              <a:rPr lang="en-US" smtClean="0"/>
+              <a:rPr lang="en-US"/>
               <a:t>Second level</a:t>
             </a:r>
           </a:p>
           <a:p>
             <a:pPr lvl="2"/>
             <a:r>
-              <a:rPr lang="en-US" smtClean="0"/>
+              <a:rPr lang="en-US"/>
               <a:t>Third level</a:t>
             </a:r>
           </a:p>
           <a:p>
             <a:pPr lvl="3"/>
             <a:r>
-              <a:rPr lang="en-US" smtClean="0"/>
+              <a:rPr lang="en-US"/>
               <a:t>Fourth level</a:t>
             </a:r>
           </a:p>
           <a:p>
             <a:pPr lvl="4"/>
             <a:r>
-              <a:rPr lang="en-US" smtClean="0"/>
+              <a:rPr lang="en-US"/>
               <a:t>Fifth level</a:t>
             </a:r>
             <a:endParaRPr lang="en-US" dirty="0"/>
@@ -1577,7 +1577,7 @@
           <a:p>
             <a:fld id="{96DFF08F-DC6B-4601-B491-B0F83F6DD2DA}" type="datetimeFigureOut">
               <a:rPr lang="en-US" dirty="0"/>
-              <a:t>3/5/2019</a:t>
+              <a:t>3/6/2019</a:t>
             </a:fld>
             <a:endParaRPr lang="en-US" dirty="0"/>
           </a:p>
@@ -1671,7 +1671,7 @@
           <a:lstStyle/>
           <a:p>
             <a:r>
-              <a:rPr lang="en-US" smtClean="0"/>
+              <a:rPr lang="en-US"/>
               <a:t>Click to edit Master title style</a:t>
             </a:r>
             <a:endParaRPr lang="en-US" dirty="0"/>
@@ -1743,7 +1743,7 @@
           <a:p>
             <a:pPr lvl="0"/>
             <a:r>
-              <a:rPr lang="en-US" smtClean="0"/>
+              <a:rPr lang="en-US"/>
               <a:t>Edit Master text styles</a:t>
             </a:r>
           </a:p>
@@ -1771,35 +1771,35 @@
           <a:p>
             <a:pPr lvl="0"/>
             <a:r>
-              <a:rPr lang="en-US" smtClean="0"/>
+              <a:rPr lang="en-US"/>
               <a:t>Edit Master text styles</a:t>
             </a:r>
           </a:p>
           <a:p>
             <a:pPr lvl="1"/>
             <a:r>
-              <a:rPr lang="en-US" smtClean="0"/>
+              <a:rPr lang="en-US"/>
               <a:t>Second level</a:t>
             </a:r>
           </a:p>
           <a:p>
             <a:pPr lvl="2"/>
             <a:r>
-              <a:rPr lang="en-US" smtClean="0"/>
+              <a:rPr lang="en-US"/>
               <a:t>Third level</a:t>
             </a:r>
           </a:p>
           <a:p>
             <a:pPr lvl="3"/>
             <a:r>
-              <a:rPr lang="en-US" smtClean="0"/>
+              <a:rPr lang="en-US"/>
               <a:t>Fourth level</a:t>
             </a:r>
           </a:p>
           <a:p>
             <a:pPr lvl="4"/>
             <a:r>
-              <a:rPr lang="en-US" smtClean="0"/>
+              <a:rPr lang="en-US"/>
               <a:t>Fifth level</a:t>
             </a:r>
             <a:endParaRPr lang="en-US" dirty="0"/>
@@ -1871,7 +1871,7 @@
           <a:p>
             <a:pPr lvl="0"/>
             <a:r>
-              <a:rPr lang="en-US" smtClean="0"/>
+              <a:rPr lang="en-US"/>
               <a:t>Edit Master text styles</a:t>
             </a:r>
           </a:p>
@@ -1899,35 +1899,35 @@
           <a:p>
             <a:pPr lvl="0"/>
             <a:r>
-              <a:rPr lang="en-US" smtClean="0"/>
+              <a:rPr lang="en-US"/>
               <a:t>Edit Master text styles</a:t>
             </a:r>
           </a:p>
           <a:p>
             <a:pPr lvl="1"/>
             <a:r>
-              <a:rPr lang="en-US" smtClean="0"/>
+              <a:rPr lang="en-US"/>
               <a:t>Second level</a:t>
             </a:r>
           </a:p>
           <a:p>
             <a:pPr lvl="2"/>
             <a:r>
-              <a:rPr lang="en-US" smtClean="0"/>
+              <a:rPr lang="en-US"/>
               <a:t>Third level</a:t>
             </a:r>
           </a:p>
           <a:p>
             <a:pPr lvl="3"/>
             <a:r>
-              <a:rPr lang="en-US" smtClean="0"/>
+              <a:rPr lang="en-US"/>
               <a:t>Fourth level</a:t>
             </a:r>
           </a:p>
           <a:p>
             <a:pPr lvl="4"/>
             <a:r>
-              <a:rPr lang="en-US" smtClean="0"/>
+              <a:rPr lang="en-US"/>
               <a:t>Fifth level</a:t>
             </a:r>
             <a:endParaRPr lang="en-US" dirty="0"/>
@@ -1951,7 +1951,7 @@
           <a:p>
             <a:fld id="{96DFF08F-DC6B-4601-B491-B0F83F6DD2DA}" type="datetimeFigureOut">
               <a:rPr lang="en-US" dirty="0"/>
-              <a:t>3/5/2019</a:t>
+              <a:t>3/6/2019</a:t>
             </a:fld>
             <a:endParaRPr lang="en-US" dirty="0"/>
           </a:p>
@@ -2040,7 +2040,7 @@
           <a:lstStyle/>
           <a:p>
             <a:r>
-              <a:rPr lang="en-US" smtClean="0"/>
+              <a:rPr lang="en-US"/>
               <a:t>Click to edit Master title style</a:t>
             </a:r>
             <a:endParaRPr lang="en-US" dirty="0"/>
@@ -2064,7 +2064,7 @@
           <a:p>
             <a:fld id="{96DFF08F-DC6B-4601-B491-B0F83F6DD2DA}" type="datetimeFigureOut">
               <a:rPr lang="en-US" dirty="0"/>
-              <a:t>3/5/2019</a:t>
+              <a:t>3/6/2019</a:t>
             </a:fld>
             <a:endParaRPr lang="en-US" dirty="0"/>
           </a:p>
@@ -2231,7 +2231,7 @@
             <a:fld id="{96DFF08F-DC6B-4601-B491-B0F83F6DD2DA}" type="datetimeFigureOut">
               <a:rPr lang="en-US" dirty="0"/>
               <a:pPr/>
-              <a:t>3/5/2019</a:t>
+              <a:t>3/6/2019</a:t>
             </a:fld>
             <a:endParaRPr lang="en-US" dirty="0"/>
           </a:p>
@@ -2420,7 +2420,7 @@
           </a:lstStyle>
           <a:p>
             <a:r>
-              <a:rPr lang="en-US" smtClean="0"/>
+              <a:rPr lang="en-US"/>
               <a:t>Click to edit Master title style</a:t>
             </a:r>
             <a:endParaRPr lang="en-US" dirty="0"/>
@@ -2449,35 +2449,35 @@
           <a:p>
             <a:pPr lvl="0"/>
             <a:r>
-              <a:rPr lang="en-US" smtClean="0"/>
+              <a:rPr lang="en-US"/>
               <a:t>Edit Master text styles</a:t>
             </a:r>
           </a:p>
           <a:p>
             <a:pPr lvl="1"/>
             <a:r>
-              <a:rPr lang="en-US" smtClean="0"/>
+              <a:rPr lang="en-US"/>
               <a:t>Second level</a:t>
             </a:r>
           </a:p>
           <a:p>
             <a:pPr lvl="2"/>
             <a:r>
-              <a:rPr lang="en-US" smtClean="0"/>
+              <a:rPr lang="en-US"/>
               <a:t>Third level</a:t>
             </a:r>
           </a:p>
           <a:p>
             <a:pPr lvl="3"/>
             <a:r>
-              <a:rPr lang="en-US" smtClean="0"/>
+              <a:rPr lang="en-US"/>
               <a:t>Fourth level</a:t>
             </a:r>
           </a:p>
           <a:p>
             <a:pPr lvl="4"/>
             <a:r>
-              <a:rPr lang="en-US" smtClean="0"/>
+              <a:rPr lang="en-US"/>
               <a:t>Fifth level</a:t>
             </a:r>
             <a:endParaRPr lang="en-US" dirty="0"/>
@@ -2549,7 +2549,7 @@
           <a:p>
             <a:pPr lvl="0"/>
             <a:r>
-              <a:rPr lang="en-US" smtClean="0"/>
+              <a:rPr lang="en-US"/>
               <a:t>Edit Master text styles</a:t>
             </a:r>
           </a:p>
@@ -2582,7 +2582,7 @@
             <a:fld id="{96DFF08F-DC6B-4601-B491-B0F83F6DD2DA}" type="datetimeFigureOut">
               <a:rPr lang="en-US" dirty="0"/>
               <a:pPr/>
-              <a:t>3/5/2019</a:t>
+              <a:t>3/6/2019</a:t>
             </a:fld>
             <a:endParaRPr lang="en-US" dirty="0"/>
           </a:p>
@@ -2784,7 +2784,7 @@
           </a:lstStyle>
           <a:p>
             <a:r>
-              <a:rPr lang="en-US" smtClean="0"/>
+              <a:rPr lang="en-US"/>
               <a:t>Click to edit Master title style</a:t>
             </a:r>
             <a:endParaRPr lang="en-US" dirty="0"/>
@@ -2854,7 +2854,7 @@
           </a:lstStyle>
           <a:p>
             <a:r>
-              <a:rPr lang="en-US" smtClean="0"/>
+              <a:rPr lang="en-US"/>
               <a:t>Click icon to add picture</a:t>
             </a:r>
             <a:endParaRPr lang="en-US" dirty="0"/>
@@ -2932,7 +2932,7 @@
           <a:p>
             <a:pPr lvl="0"/>
             <a:r>
-              <a:rPr lang="en-US" smtClean="0"/>
+              <a:rPr lang="en-US"/>
               <a:t>Edit Master text styles</a:t>
             </a:r>
           </a:p>
@@ -2955,7 +2955,7 @@
           <a:p>
             <a:fld id="{96DFF08F-DC6B-4601-B491-B0F83F6DD2DA}" type="datetimeFigureOut">
               <a:rPr lang="en-US" dirty="0"/>
-              <a:t>3/5/2019</a:t>
+              <a:t>3/6/2019</a:t>
             </a:fld>
             <a:endParaRPr lang="en-US" dirty="0"/>
           </a:p>
@@ -3135,7 +3135,7 @@
           <a:lstStyle/>
           <a:p>
             <a:r>
-              <a:rPr lang="en-US" smtClean="0"/>
+              <a:rPr lang="en-US"/>
               <a:t>Click to edit Master title style</a:t>
             </a:r>
             <a:endParaRPr lang="en-US" dirty="0"/>
@@ -3169,35 +3169,35 @@
           <a:p>
             <a:pPr lvl="0"/>
             <a:r>
-              <a:rPr lang="en-US" smtClean="0"/>
+              <a:rPr lang="en-US"/>
               <a:t>Edit Master text styles</a:t>
             </a:r>
           </a:p>
           <a:p>
             <a:pPr lvl="1"/>
             <a:r>
-              <a:rPr lang="en-US" smtClean="0"/>
+              <a:rPr lang="en-US"/>
               <a:t>Second level</a:t>
             </a:r>
           </a:p>
           <a:p>
             <a:pPr lvl="2"/>
             <a:r>
-              <a:rPr lang="en-US" smtClean="0"/>
+              <a:rPr lang="en-US"/>
               <a:t>Third level</a:t>
             </a:r>
           </a:p>
           <a:p>
             <a:pPr lvl="3"/>
             <a:r>
-              <a:rPr lang="en-US" smtClean="0"/>
+              <a:rPr lang="en-US"/>
               <a:t>Fourth level</a:t>
             </a:r>
           </a:p>
           <a:p>
             <a:pPr lvl="4"/>
             <a:r>
-              <a:rPr lang="en-US" smtClean="0"/>
+              <a:rPr lang="en-US"/>
               <a:t>Fifth level</a:t>
             </a:r>
             <a:endParaRPr lang="en-US" dirty="0"/>
@@ -3238,7 +3238,7 @@
             <a:fld id="{96DFF08F-DC6B-4601-B491-B0F83F6DD2DA}" type="datetimeFigureOut">
               <a:rPr lang="en-US" dirty="0"/>
               <a:pPr/>
-              <a:t>3/5/2019</a:t>
+              <a:t>3/6/2019</a:t>
             </a:fld>
             <a:endParaRPr lang="en-US" dirty="0"/>
           </a:p>
@@ -3774,10 +3774,9 @@
           <a:lstStyle/>
           <a:p>
             <a:r>
-              <a:rPr lang="en-US" dirty="0" smtClean="0"/>
+              <a:rPr lang="en-US" dirty="0"/>
               <a:t>Version Control</a:t>
             </a:r>
-            <a:endParaRPr lang="en-US" dirty="0"/>
           </a:p>
         </p:txBody>
       </p:sp>
@@ -3810,13 +3809,6 @@
   <p:clrMapOvr>
     <a:masterClrMapping/>
   </p:clrMapOvr>
-  <p:timing>
-    <p:tnLst>
-      <p:par>
-        <p:cTn id="1" dur="indefinite" restart="never" nodeType="tmRoot"/>
-      </p:par>
-    </p:tnLst>
-  </p:timing>
 </p:sld>
 </file>
 
@@ -4137,7 +4129,7 @@
           <a:p>
             <a:pPr lvl="1"/>
             <a:r>
-              <a:rPr lang="en-US" spc="-50" dirty="0" smtClean="0">
+              <a:rPr lang="en-US" spc="-50" dirty="0">
                 <a:latin typeface="+mj-lt"/>
                 <a:ea typeface="+mj-ea"/>
                 <a:cs typeface="+mj-cs"/>
@@ -4145,7 +4137,7 @@
               <a:t>Once you have a remote repo setup, you will need to add a remote repo </a:t>
             </a:r>
             <a:r>
-              <a:rPr lang="en-US" spc="-50" dirty="0" err="1" smtClean="0">
+              <a:rPr lang="en-US" spc="-50" dirty="0" err="1">
                 <a:latin typeface="+mj-lt"/>
                 <a:ea typeface="+mj-ea"/>
                 <a:cs typeface="+mj-cs"/>
@@ -4153,7 +4145,7 @@
               <a:t>url</a:t>
             </a:r>
             <a:r>
-              <a:rPr lang="en-US" spc="-50" dirty="0" smtClean="0">
+              <a:rPr lang="en-US" spc="-50" dirty="0">
                 <a:latin typeface="+mj-lt"/>
                 <a:ea typeface="+mj-ea"/>
                 <a:cs typeface="+mj-cs"/>
@@ -4161,7 +4153,7 @@
               <a:t> to your local </a:t>
             </a:r>
             <a:r>
-              <a:rPr lang="en-US" spc="-50" dirty="0" err="1" smtClean="0">
+              <a:rPr lang="en-US" spc="-50" dirty="0" err="1">
                 <a:latin typeface="+mj-lt"/>
                 <a:ea typeface="+mj-ea"/>
                 <a:cs typeface="+mj-cs"/>
@@ -4169,7 +4161,7 @@
               <a:t>git</a:t>
             </a:r>
             <a:r>
-              <a:rPr lang="en-US" spc="-50" dirty="0" smtClean="0">
+              <a:rPr lang="en-US" spc="-50" dirty="0">
                 <a:latin typeface="+mj-lt"/>
                 <a:ea typeface="+mj-ea"/>
                 <a:cs typeface="+mj-cs"/>
@@ -4177,7 +4169,7 @@
               <a:t> </a:t>
             </a:r>
             <a:r>
-              <a:rPr lang="en-US" spc="-50" dirty="0" err="1" smtClean="0">
+              <a:rPr lang="en-US" spc="-50" dirty="0" err="1">
                 <a:latin typeface="+mj-lt"/>
                 <a:ea typeface="+mj-ea"/>
                 <a:cs typeface="+mj-cs"/>
@@ -4185,7 +4177,7 @@
               <a:t>config</a:t>
             </a:r>
             <a:r>
-              <a:rPr lang="en-US" spc="-50" dirty="0" smtClean="0">
+              <a:rPr lang="en-US" spc="-50" dirty="0">
                 <a:latin typeface="+mj-lt"/>
                 <a:ea typeface="+mj-ea"/>
                 <a:cs typeface="+mj-cs"/>
@@ -4193,7 +4185,7 @@
               <a:t>, and set an upstream branch for your local branches. The </a:t>
             </a:r>
             <a:r>
-              <a:rPr lang="en-US" spc="-50" dirty="0" err="1" smtClean="0">
+              <a:rPr lang="en-US" spc="-50" dirty="0" err="1">
                 <a:latin typeface="+mj-lt"/>
                 <a:ea typeface="+mj-ea"/>
                 <a:cs typeface="+mj-cs"/>
@@ -4201,7 +4193,7 @@
               <a:t>git</a:t>
             </a:r>
             <a:r>
-              <a:rPr lang="en-US" spc="-50" dirty="0" smtClean="0">
+              <a:rPr lang="en-US" spc="-50" dirty="0">
                 <a:latin typeface="+mj-lt"/>
                 <a:ea typeface="+mj-ea"/>
                 <a:cs typeface="+mj-cs"/>
@@ -4211,7 +4203,7 @@
           </a:p>
           <a:p>
             <a:pPr lvl="1"/>
-            <a:endParaRPr lang="en-US" spc="-50" dirty="0" smtClean="0">
+            <a:endParaRPr lang="en-US" spc="-50" dirty="0">
               <a:latin typeface="+mj-lt"/>
               <a:ea typeface="+mj-ea"/>
               <a:cs typeface="+mj-cs"/>
@@ -4220,7 +4212,7 @@
           <a:p>
             <a:pPr lvl="1"/>
             <a:r>
-              <a:rPr lang="en-US" sz="2000" spc="-50" dirty="0" err="1" smtClean="0">
+              <a:rPr lang="en-US" sz="2000" spc="-50" dirty="0" err="1">
                 <a:solidFill>
                   <a:schemeClr val="accent2">
                     <a:lumMod val="75000"/>
@@ -4232,7 +4224,7 @@
               <a:t>git</a:t>
             </a:r>
             <a:r>
-              <a:rPr lang="en-US" sz="2000" spc="-50" dirty="0" smtClean="0">
+              <a:rPr lang="en-US" sz="2000" spc="-50" dirty="0">
                 <a:solidFill>
                   <a:schemeClr val="accent2">
                     <a:lumMod val="75000"/>
@@ -4244,7 +4236,7 @@
               <a:t> remote add &lt;</a:t>
             </a:r>
             <a:r>
-              <a:rPr lang="en-US" sz="2000" spc="-50" dirty="0" err="1" smtClean="0">
+              <a:rPr lang="en-US" sz="2000" spc="-50" dirty="0" err="1">
                 <a:solidFill>
                   <a:schemeClr val="accent2">
                     <a:lumMod val="75000"/>
@@ -4256,7 +4248,7 @@
               <a:t>remote_name</a:t>
             </a:r>
             <a:r>
-              <a:rPr lang="en-US" sz="2000" spc="-50" dirty="0" smtClean="0">
+              <a:rPr lang="en-US" sz="2000" spc="-50" dirty="0">
                 <a:solidFill>
                   <a:schemeClr val="accent2">
                     <a:lumMod val="75000"/>
@@ -4268,7 +4260,7 @@
               <a:t>&gt; &lt;</a:t>
             </a:r>
             <a:r>
-              <a:rPr lang="en-US" sz="2000" spc="-50" dirty="0" err="1" smtClean="0">
+              <a:rPr lang="en-US" sz="2000" spc="-50" dirty="0" err="1">
                 <a:solidFill>
                   <a:schemeClr val="accent2">
                     <a:lumMod val="75000"/>
@@ -4280,7 +4272,7 @@
               <a:t>remote_repo_url</a:t>
             </a:r>
             <a:r>
-              <a:rPr lang="en-US" sz="2000" spc="-50" dirty="0" smtClean="0">
+              <a:rPr lang="en-US" sz="2000" spc="-50" dirty="0">
                 <a:solidFill>
                   <a:schemeClr val="accent2">
                     <a:lumMod val="75000"/>
@@ -4294,7 +4286,7 @@
           </a:p>
           <a:p>
             <a:pPr lvl="1"/>
-            <a:endParaRPr lang="en-US" sz="2000" spc="-50" dirty="0" smtClean="0">
+            <a:endParaRPr lang="en-US" sz="2000" spc="-50" dirty="0">
               <a:solidFill>
                 <a:schemeClr val="accent2">
                   <a:lumMod val="75000"/>
@@ -4307,7 +4299,7 @@
           <a:p>
             <a:pPr lvl="1"/>
             <a:r>
-              <a:rPr lang="en-US" spc="-50" dirty="0" smtClean="0">
+              <a:rPr lang="en-US" spc="-50" dirty="0">
                 <a:latin typeface="+mj-lt"/>
                 <a:ea typeface="+mj-ea"/>
                 <a:cs typeface="+mj-cs"/>
@@ -4315,7 +4307,7 @@
               <a:t>This command will map remote repository at &lt;</a:t>
             </a:r>
             <a:r>
-              <a:rPr lang="en-US" spc="-50" dirty="0" err="1" smtClean="0">
+              <a:rPr lang="en-US" spc="-50" dirty="0" err="1">
                 <a:latin typeface="+mj-lt"/>
                 <a:ea typeface="+mj-ea"/>
                 <a:cs typeface="+mj-cs"/>
@@ -4323,7 +4315,7 @@
               <a:t>remote_repo_url</a:t>
             </a:r>
             <a:r>
-              <a:rPr lang="en-US" spc="-50" dirty="0" smtClean="0">
+              <a:rPr lang="en-US" spc="-50" dirty="0">
                 <a:latin typeface="+mj-lt"/>
                 <a:ea typeface="+mj-ea"/>
                 <a:cs typeface="+mj-cs"/>
@@ -4331,7 +4323,7 @@
               <a:t>&gt; to a ref in your local repo under &lt;</a:t>
             </a:r>
             <a:r>
-              <a:rPr lang="en-US" spc="-50" dirty="0" err="1" smtClean="0">
+              <a:rPr lang="en-US" spc="-50" dirty="0" err="1">
                 <a:latin typeface="+mj-lt"/>
                 <a:ea typeface="+mj-ea"/>
                 <a:cs typeface="+mj-cs"/>
@@ -4339,7 +4331,7 @@
               <a:t>remote_name</a:t>
             </a:r>
             <a:r>
-              <a:rPr lang="en-US" spc="-50" dirty="0" smtClean="0">
+              <a:rPr lang="en-US" spc="-50" dirty="0">
                 <a:latin typeface="+mj-lt"/>
                 <a:ea typeface="+mj-ea"/>
                 <a:cs typeface="+mj-cs"/>
@@ -4349,7 +4341,7 @@
           </a:p>
           <a:p>
             <a:pPr lvl="1"/>
-            <a:endParaRPr lang="en-US" spc="-50" dirty="0" smtClean="0">
+            <a:endParaRPr lang="en-US" spc="-50" dirty="0">
               <a:latin typeface="+mj-lt"/>
               <a:ea typeface="+mj-ea"/>
               <a:cs typeface="+mj-cs"/>
@@ -4358,7 +4350,7 @@
           <a:p>
             <a:pPr lvl="1"/>
             <a:r>
-              <a:rPr lang="en-US" sz="2000" spc="-50" dirty="0" err="1" smtClean="0">
+              <a:rPr lang="en-US" sz="2000" spc="-50" dirty="0" err="1">
                 <a:solidFill>
                   <a:schemeClr val="accent2">
                     <a:lumMod val="75000"/>
@@ -4370,7 +4362,7 @@
               <a:t>git</a:t>
             </a:r>
             <a:r>
-              <a:rPr lang="en-US" sz="2000" spc="-50" dirty="0" smtClean="0">
+              <a:rPr lang="en-US" sz="2000" spc="-50" dirty="0">
                 <a:solidFill>
                   <a:schemeClr val="accent2">
                     <a:lumMod val="75000"/>
@@ -4382,7 +4374,7 @@
               <a:t> push -u &lt;</a:t>
             </a:r>
             <a:r>
-              <a:rPr lang="en-US" sz="2000" spc="-50" dirty="0" err="1" smtClean="0">
+              <a:rPr lang="en-US" sz="2000" spc="-50" dirty="0" err="1">
                 <a:solidFill>
                   <a:schemeClr val="accent2">
                     <a:lumMod val="75000"/>
@@ -4394,7 +4386,7 @@
               <a:t>remote_name</a:t>
             </a:r>
             <a:r>
-              <a:rPr lang="en-US" sz="2000" spc="-50" dirty="0" smtClean="0">
+              <a:rPr lang="en-US" sz="2000" spc="-50" dirty="0">
                 <a:solidFill>
                   <a:schemeClr val="accent2">
                     <a:lumMod val="75000"/>
@@ -4406,7 +4398,7 @@
               <a:t>&gt; &lt;</a:t>
             </a:r>
             <a:r>
-              <a:rPr lang="en-US" sz="2000" spc="-50" dirty="0" err="1" smtClean="0">
+              <a:rPr lang="en-US" sz="2000" spc="-50" dirty="0" err="1">
                 <a:solidFill>
                   <a:schemeClr val="accent2">
                     <a:lumMod val="75000"/>
@@ -4418,7 +4410,7 @@
               <a:t>local_branch_name</a:t>
             </a:r>
             <a:r>
-              <a:rPr lang="en-US" sz="2000" spc="-50" dirty="0" smtClean="0">
+              <a:rPr lang="en-US" sz="2000" spc="-50" dirty="0">
                 <a:solidFill>
                   <a:schemeClr val="accent2">
                     <a:lumMod val="75000"/>
@@ -4432,7 +4424,7 @@
           </a:p>
           <a:p>
             <a:pPr lvl="1"/>
-            <a:endParaRPr lang="en-US" sz="2000" spc="-50" dirty="0" smtClean="0">
+            <a:endParaRPr lang="en-US" sz="2000" spc="-50" dirty="0">
               <a:solidFill>
                 <a:schemeClr val="accent2">
                   <a:lumMod val="75000"/>
@@ -4445,7 +4437,7 @@
           <a:p>
             <a:pPr lvl="1"/>
             <a:r>
-              <a:rPr lang="en-US" spc="-50" dirty="0" smtClean="0">
+              <a:rPr lang="en-US" spc="-50" dirty="0">
                 <a:latin typeface="+mj-lt"/>
                 <a:ea typeface="+mj-ea"/>
                 <a:cs typeface="+mj-cs"/>
@@ -4453,7 +4445,7 @@
               <a:t>This command will push the local repo branch under &lt;</a:t>
             </a:r>
             <a:r>
-              <a:rPr lang="en-US" spc="-50" dirty="0" err="1" smtClean="0">
+              <a:rPr lang="en-US" spc="-50" dirty="0" err="1">
                 <a:latin typeface="+mj-lt"/>
                 <a:ea typeface="+mj-ea"/>
                 <a:cs typeface="+mj-cs"/>
@@ -4461,7 +4453,7 @@
               <a:t>local_branc_name</a:t>
             </a:r>
             <a:r>
-              <a:rPr lang="en-US" spc="-50" dirty="0" smtClean="0">
+              <a:rPr lang="en-US" spc="-50" dirty="0">
                 <a:latin typeface="+mj-lt"/>
                 <a:ea typeface="+mj-ea"/>
                 <a:cs typeface="+mj-cs"/>
@@ -4469,7 +4461,7 @@
               <a:t>&gt; to the remote repo at &lt;</a:t>
             </a:r>
             <a:r>
-              <a:rPr lang="en-US" spc="-50" dirty="0" err="1" smtClean="0">
+              <a:rPr lang="en-US" spc="-50" dirty="0" err="1">
                 <a:latin typeface="+mj-lt"/>
                 <a:ea typeface="+mj-ea"/>
                 <a:cs typeface="+mj-cs"/>
@@ -4477,18 +4469,13 @@
               <a:t>remote_name</a:t>
             </a:r>
             <a:r>
-              <a:rPr lang="en-US" spc="-50" dirty="0" smtClean="0">
+              <a:rPr lang="en-US" spc="-50" dirty="0">
                 <a:latin typeface="+mj-lt"/>
                 <a:ea typeface="+mj-ea"/>
                 <a:cs typeface="+mj-cs"/>
               </a:rPr>
               <a:t>&gt;.</a:t>
             </a:r>
-            <a:endParaRPr lang="en-US" spc="-50" dirty="0">
-              <a:latin typeface="+mj-lt"/>
-              <a:ea typeface="+mj-ea"/>
-              <a:cs typeface="+mj-cs"/>
-            </a:endParaRPr>
           </a:p>
         </p:txBody>
       </p:sp>
@@ -4502,13 +4489,6 @@
   <p:clrMapOvr>
     <a:masterClrMapping/>
   </p:clrMapOvr>
-  <p:timing>
-    <p:tnLst>
-      <p:par>
-        <p:cTn id="1" dur="indefinite" restart="never" nodeType="tmRoot"/>
-      </p:par>
-    </p:tnLst>
-  </p:timing>
 </p:sld>
 </file>
 
@@ -4652,15 +4632,7 @@
                 <a:ea typeface="+mj-ea"/>
                 <a:cs typeface="+mj-cs"/>
               </a:rPr>
-              <a:t> installation (or an individual repository) from the command line</a:t>
-            </a:r>
-            <a:r>
-              <a:rPr lang="en-US" spc="-50" dirty="0" smtClean="0">
-                <a:latin typeface="+mj-lt"/>
-                <a:ea typeface="+mj-ea"/>
-                <a:cs typeface="+mj-cs"/>
-              </a:rPr>
-              <a:t>.</a:t>
+              <a:t> installation (or an individual repository) from the command line.</a:t>
             </a:r>
           </a:p>
           <a:p>
@@ -4687,21 +4659,8 @@
                 <a:ea typeface="+mj-ea"/>
                 <a:cs typeface="+mj-cs"/>
               </a:rPr>
-              <a:t> stores configuration options in three separate files, which lets you scope options to individual repositories (local), user (Global), or the entire system (system</a:t>
-            </a:r>
-            <a:r>
-              <a:rPr lang="en-US" spc="-50" dirty="0" smtClean="0">
-                <a:latin typeface="+mj-lt"/>
-                <a:ea typeface="+mj-ea"/>
-                <a:cs typeface="+mj-cs"/>
-              </a:rPr>
-              <a:t>):</a:t>
-            </a:r>
-            <a:endParaRPr lang="en-US" spc="-50" dirty="0">
-              <a:latin typeface="+mj-lt"/>
-              <a:ea typeface="+mj-ea"/>
-              <a:cs typeface="+mj-cs"/>
-            </a:endParaRPr>
+              <a:t> stores configuration options in three separate files, which lets you scope options to individual repositories (local), user (Global), or the entire system (system):</a:t>
+            </a:r>
           </a:p>
           <a:p>
             <a:pPr lvl="1"/>
@@ -4844,13 +4803,6 @@
   <p:clrMapOvr>
     <a:masterClrMapping/>
   </p:clrMapOvr>
-  <p:timing>
-    <p:tnLst>
-      <p:par>
-        <p:cTn id="1" dur="indefinite" restart="never" nodeType="tmRoot"/>
-      </p:par>
-    </p:tnLst>
-  </p:timing>
 </p:sld>
 </file>
 
@@ -4930,15 +4882,7 @@
                 <a:ea typeface="+mj-ea"/>
                 <a:cs typeface="+mj-cs"/>
               </a:rPr>
-              <a:t>Define the author name to be used for all commits in the current repository. Typically, you’ll want to use the --global flag to set configuration options for the current user</a:t>
-            </a:r>
-            <a:r>
-              <a:rPr lang="en-US" spc="-50" dirty="0" smtClean="0">
-                <a:latin typeface="+mj-lt"/>
-                <a:ea typeface="+mj-ea"/>
-                <a:cs typeface="+mj-cs"/>
-              </a:rPr>
-              <a:t>.</a:t>
+              <a:t>Define the author name to be used for all commits in the current repository. Typically, you’ll want to use the --global flag to set configuration options for the current user.</a:t>
             </a:r>
           </a:p>
           <a:p>
@@ -4997,19 +4941,7 @@
                 <a:latin typeface="Consolas" panose="020B0609020204030204" pitchFamily="49" charset="0"/>
                 <a:cs typeface="Consolas" panose="020B0609020204030204" pitchFamily="49" charset="0"/>
               </a:rPr>
-              <a:t> --global user.name &lt;name</a:t>
-            </a:r>
-            <a:r>
-              <a:rPr lang="en-US" sz="2000" spc="-50" dirty="0" smtClean="0">
-                <a:solidFill>
-                  <a:schemeClr val="accent2">
-                    <a:lumMod val="75000"/>
-                  </a:schemeClr>
-                </a:solidFill>
-                <a:latin typeface="Consolas" panose="020B0609020204030204" pitchFamily="49" charset="0"/>
-                <a:cs typeface="Consolas" panose="020B0609020204030204" pitchFamily="49" charset="0"/>
-              </a:rPr>
-              <a:t>&gt;</a:t>
+              <a:t> --global user.name &lt;name&gt;</a:t>
             </a:r>
           </a:p>
           <a:p>
@@ -5056,20 +4988,12 @@
                 <a:ea typeface="+mj-ea"/>
                 <a:cs typeface="+mj-cs"/>
               </a:rPr>
-              <a:t>repository</a:t>
-            </a:r>
-            <a:r>
-              <a:rPr lang="en-US" spc="-50" smtClean="0">
-                <a:latin typeface="+mj-lt"/>
-                <a:ea typeface="+mj-ea"/>
-                <a:cs typeface="+mj-cs"/>
-              </a:rPr>
-              <a:t>.</a:t>
+              <a:t>repository.</a:t>
             </a:r>
           </a:p>
           <a:p>
             <a:pPr lvl="1"/>
-            <a:endParaRPr lang="en-US" spc="-50" dirty="0" smtClean="0">
+            <a:endParaRPr lang="en-US" spc="-50" dirty="0">
               <a:latin typeface="+mj-lt"/>
               <a:ea typeface="+mj-ea"/>
               <a:cs typeface="+mj-cs"/>
@@ -5170,13 +5094,6 @@
   <p:clrMapOvr>
     <a:masterClrMapping/>
   </p:clrMapOvr>
-  <p:timing>
-    <p:tnLst>
-      <p:par>
-        <p:cTn id="1" dur="indefinite" restart="never" nodeType="tmRoot"/>
-      </p:par>
-    </p:tnLst>
-  </p:timing>
 </p:sld>
 </file>
 
@@ -5320,15 +5237,7 @@
                 <a:ea typeface="+mj-ea"/>
                 <a:cs typeface="+mj-cs"/>
               </a:rPr>
-              <a:t> remote command offers such utility</a:t>
-            </a:r>
-            <a:r>
-              <a:rPr lang="en-US" spc="-50" dirty="0" smtClean="0">
-                <a:latin typeface="+mj-lt"/>
-                <a:ea typeface="+mj-ea"/>
-                <a:cs typeface="+mj-cs"/>
-              </a:rPr>
-              <a:t>.</a:t>
+              <a:t> remote command offers such utility.</a:t>
             </a:r>
           </a:p>
           <a:p>
@@ -5402,7 +5311,7 @@
               <a:t>remote_repo_url</a:t>
             </a:r>
             <a:r>
-              <a:rPr lang="en-US" sz="2000" spc="-50" dirty="0" smtClean="0">
+              <a:rPr lang="en-US" sz="2000" spc="-50" dirty="0">
                 <a:solidFill>
                   <a:schemeClr val="accent2">
                     <a:lumMod val="75000"/>
@@ -5466,15 +5375,7 @@
                 <a:ea typeface="+mj-ea"/>
                 <a:cs typeface="+mj-cs"/>
               </a:rPr>
-              <a:t>&gt;. Once you have mapped the remote repo you can push local branches to it</a:t>
-            </a:r>
-            <a:r>
-              <a:rPr lang="en-US" spc="-50" dirty="0" smtClean="0">
-                <a:latin typeface="+mj-lt"/>
-                <a:ea typeface="+mj-ea"/>
-                <a:cs typeface="+mj-cs"/>
-              </a:rPr>
-              <a:t>.</a:t>
+              <a:t>&gt;. Once you have mapped the remote repo you can push local branches to it.</a:t>
             </a:r>
           </a:p>
           <a:p>
@@ -5548,7 +5449,7 @@
               <a:t>local_branch_name</a:t>
             </a:r>
             <a:r>
-              <a:rPr lang="en-US" sz="2000" spc="-50" dirty="0" smtClean="0">
+              <a:rPr lang="en-US" sz="2000" spc="-50" dirty="0">
                 <a:solidFill>
                   <a:schemeClr val="accent2">
                     <a:lumMod val="75000"/>
@@ -5627,13 +5528,6 @@
   <p:clrMapOvr>
     <a:masterClrMapping/>
   </p:clrMapOvr>
-  <p:timing>
-    <p:tnLst>
-      <p:par>
-        <p:cTn id="1" dur="indefinite" restart="never" nodeType="tmRoot"/>
-      </p:par>
-    </p:tnLst>
-  </p:timing>
 </p:sld>
 </file>
 
@@ -5670,10 +5564,9 @@
           <a:lstStyle/>
           <a:p>
             <a:r>
-              <a:rPr lang="en-US" dirty="0" smtClean="0"/>
+              <a:rPr lang="en-US" dirty="0"/>
               <a:t>What is version control?</a:t>
             </a:r>
-            <a:endParaRPr lang="en-US" dirty="0"/>
           </a:p>
         </p:txBody>
       </p:sp>
@@ -5696,19 +5589,14 @@
               <a:rPr lang="en-US" dirty="0"/>
               <a:t>Version control systems are a category of software tools that help a software team manage changes to source code over time. Version control software keeps track of every modification to the code in a special kind of database. </a:t>
             </a:r>
-            <a:endParaRPr lang="en-US" dirty="0" smtClean="0"/>
           </a:p>
           <a:p>
             <a:endParaRPr lang="en-US" dirty="0"/>
           </a:p>
           <a:p>
             <a:r>
-              <a:rPr lang="en-US" dirty="0" smtClean="0"/>
-              <a:t>If </a:t>
-            </a:r>
-            <a:r>
               <a:rPr lang="en-US" dirty="0"/>
-              <a:t>a mistake is made, developers can turn back the clock and compare earlier versions of the code to help fix the mistake while minimizing disruption to all team members.</a:t>
+              <a:t>If a mistake is made, developers can turn back the clock and compare earlier versions of the code to help fix the mistake while minimizing disruption to all team members.</a:t>
             </a:r>
             <a:endParaRPr lang="en-US" dirty="0">
               <a:solidFill>
@@ -5728,13 +5616,6 @@
   <p:clrMapOvr>
     <a:masterClrMapping/>
   </p:clrMapOvr>
-  <p:timing>
-    <p:tnLst>
-      <p:par>
-        <p:cTn id="1" dur="indefinite" restart="never" nodeType="tmRoot"/>
-      </p:par>
-    </p:tnLst>
-  </p:timing>
 </p:sld>
 </file>
 
@@ -5783,14 +5664,13 @@
               <a:t>What is </a:t>
             </a:r>
             <a:r>
-              <a:rPr lang="en-US" dirty="0" err="1" smtClean="0"/>
+              <a:rPr lang="en-US" dirty="0" err="1"/>
               <a:t>Git</a:t>
             </a:r>
             <a:r>
-              <a:rPr lang="en-US" dirty="0" smtClean="0"/>
+              <a:rPr lang="en-US" dirty="0"/>
               <a:t>?</a:t>
             </a:r>
-            <a:endParaRPr lang="en-US" dirty="0"/>
           </a:p>
         </p:txBody>
       </p:sp>
@@ -5818,26 +5698,22 @@
               <a:t>Git</a:t>
             </a:r>
             <a:r>
-              <a:rPr lang="en-US" dirty="0" smtClean="0"/>
+              <a:rPr lang="en-US" dirty="0"/>
               <a:t>.</a:t>
             </a:r>
           </a:p>
           <a:p>
             <a:r>
-              <a:rPr lang="en-US" dirty="0" err="1" smtClean="0"/>
+              <a:rPr lang="en-US" dirty="0" err="1"/>
               <a:t>Git</a:t>
             </a:r>
             <a:r>
-              <a:rPr lang="en-US" dirty="0" smtClean="0"/>
-              <a:t> is </a:t>
-            </a:r>
-            <a:r>
               <a:rPr lang="en-US" dirty="0"/>
-              <a:t>a distributed version control system.</a:t>
-            </a:r>
-          </a:p>
-          <a:p>
-            <a:endParaRPr lang="en-US" dirty="0" smtClean="0">
+              <a:t> is a distributed version control system.</a:t>
+            </a:r>
+          </a:p>
+          <a:p>
+            <a:endParaRPr lang="en-US" dirty="0">
               <a:solidFill>
                 <a:schemeClr val="tx1"/>
               </a:solidFill>
@@ -5879,13 +5755,6 @@
   <p:clrMapOvr>
     <a:masterClrMapping/>
   </p:clrMapOvr>
-  <p:timing>
-    <p:tnLst>
-      <p:par>
-        <p:cTn id="1" dur="indefinite" restart="never" nodeType="tmRoot"/>
-      </p:par>
-    </p:tnLst>
-  </p:timing>
 </p:sld>
 </file>
 
@@ -5922,7 +5791,7 @@
           <a:lstStyle/>
           <a:p>
             <a:r>
-              <a:rPr lang="en-US" sz="3200" b="1" dirty="0" smtClean="0"/>
+              <a:rPr lang="en-US" sz="3200" b="1" dirty="0"/>
               <a:t>Setting up a repository</a:t>
             </a:r>
             <a:endParaRPr lang="en-US" dirty="0"/>
@@ -5948,7 +5817,7 @@
           <a:p>
             <a:pPr lvl="1"/>
             <a:r>
-              <a:rPr lang="en-US" sz="2400" dirty="0" err="1" smtClean="0">
+              <a:rPr lang="en-US" sz="2400" dirty="0" err="1">
                 <a:solidFill>
                   <a:schemeClr val="tx1"/>
                 </a:solidFill>
@@ -5958,7 +5827,7 @@
               <a:t>git</a:t>
             </a:r>
             <a:r>
-              <a:rPr lang="en-US" sz="2400" dirty="0" smtClean="0">
+              <a:rPr lang="en-US" sz="2400" dirty="0">
                 <a:solidFill>
                   <a:schemeClr val="tx1"/>
                 </a:solidFill>
@@ -5968,7 +5837,7 @@
               <a:t> </a:t>
             </a:r>
             <a:r>
-              <a:rPr lang="en-US" sz="2400" dirty="0" err="1" smtClean="0">
+              <a:rPr lang="en-US" sz="2400" dirty="0" err="1">
                 <a:solidFill>
                   <a:schemeClr val="tx1"/>
                 </a:solidFill>
@@ -5978,7 +5847,7 @@
               <a:t>init</a:t>
             </a:r>
             <a:r>
-              <a:rPr lang="en-US" sz="2400" dirty="0" smtClean="0">
+              <a:rPr lang="en-US" sz="2400" dirty="0">
                 <a:solidFill>
                   <a:schemeClr val="tx1"/>
                 </a:solidFill>
@@ -5988,7 +5857,7 @@
               <a:t> / </a:t>
             </a:r>
             <a:r>
-              <a:rPr lang="en-US" sz="2400" dirty="0" err="1" smtClean="0">
+              <a:rPr lang="en-US" sz="2400" dirty="0" err="1">
                 <a:solidFill>
                   <a:schemeClr val="tx1"/>
                 </a:solidFill>
@@ -5998,7 +5867,7 @@
               <a:t>git</a:t>
             </a:r>
             <a:r>
-              <a:rPr lang="en-US" sz="2400" dirty="0" smtClean="0">
+              <a:rPr lang="en-US" sz="2400" dirty="0">
                 <a:solidFill>
                   <a:schemeClr val="tx1"/>
                 </a:solidFill>
@@ -6008,7 +5877,7 @@
               <a:t> clone / </a:t>
             </a:r>
             <a:r>
-              <a:rPr lang="en-US" sz="2400" dirty="0" err="1" smtClean="0">
+              <a:rPr lang="en-US" sz="2400" dirty="0" err="1">
                 <a:solidFill>
                   <a:schemeClr val="tx1"/>
                 </a:solidFill>
@@ -6018,7 +5887,7 @@
               <a:t>git</a:t>
             </a:r>
             <a:r>
-              <a:rPr lang="en-US" sz="2400" dirty="0" smtClean="0">
+              <a:rPr lang="en-US" sz="2400" dirty="0">
                 <a:solidFill>
                   <a:schemeClr val="tx1"/>
                 </a:solidFill>
@@ -6028,7 +5897,7 @@
               <a:t> </a:t>
             </a:r>
             <a:r>
-              <a:rPr lang="en-US" sz="2400" dirty="0" err="1" smtClean="0">
+              <a:rPr lang="en-US" sz="2400" dirty="0" err="1">
                 <a:solidFill>
                   <a:schemeClr val="tx1"/>
                 </a:solidFill>
@@ -6037,7 +5906,7 @@
               </a:rPr>
               <a:t>config</a:t>
             </a:r>
-            <a:endParaRPr lang="en-US" sz="2400" dirty="0" smtClean="0">
+            <a:endParaRPr lang="en-US" sz="2400" dirty="0">
               <a:solidFill>
                 <a:schemeClr val="tx1"/>
               </a:solidFill>
@@ -6057,13 +5926,6 @@
   <p:clrMapOvr>
     <a:masterClrMapping/>
   </p:clrMapOvr>
-  <p:timing>
-    <p:tnLst>
-      <p:par>
-        <p:cTn id="1" dur="indefinite" restart="never" nodeType="tmRoot"/>
-      </p:par>
-    </p:tnLst>
-  </p:timing>
 </p:sld>
 </file>
 
@@ -6100,15 +5962,15 @@
           <a:lstStyle/>
           <a:p>
             <a:r>
-              <a:rPr lang="en-US" sz="3200" dirty="0" smtClean="0"/>
+              <a:rPr lang="en-US" sz="3200" dirty="0"/>
               <a:t>Configure </a:t>
             </a:r>
             <a:r>
-              <a:rPr lang="en-US" sz="3200" dirty="0" err="1" smtClean="0"/>
+              <a:rPr lang="en-US" sz="3200" dirty="0" err="1"/>
               <a:t>git</a:t>
             </a:r>
             <a:r>
-              <a:rPr lang="en-US" sz="3200" b="1" dirty="0" smtClean="0"/>
+              <a:rPr lang="en-US" sz="3200" b="1" dirty="0"/>
               <a:t>: </a:t>
             </a:r>
             <a:r>
@@ -6120,7 +5982,7 @@
               <a:t> </a:t>
             </a:r>
             <a:r>
-              <a:rPr lang="en-US" sz="3200" b="1" dirty="0" err="1" smtClean="0"/>
+              <a:rPr lang="en-US" sz="3200" b="1" dirty="0" err="1"/>
               <a:t>config</a:t>
             </a:r>
             <a:endParaRPr lang="en-US" sz="3200" b="1" dirty="0"/>
@@ -6172,7 +6034,7 @@
               <a:t> </a:t>
             </a:r>
             <a:r>
-              <a:rPr lang="en-US" sz="2000" spc="-50" dirty="0" err="1" smtClean="0">
+              <a:rPr lang="en-US" sz="2000" spc="-50" dirty="0" err="1">
                 <a:solidFill>
                   <a:schemeClr val="accent2">
                     <a:lumMod val="75000"/>
@@ -6185,7 +6047,7 @@
               <a:t>config</a:t>
             </a:r>
             <a:r>
-              <a:rPr lang="en-US" sz="2000" spc="-50" dirty="0" smtClean="0">
+              <a:rPr lang="en-US" sz="2000" spc="-50" dirty="0">
                 <a:solidFill>
                   <a:schemeClr val="accent2">
                     <a:lumMod val="75000"/>
@@ -6198,7 +6060,7 @@
               <a:t> --global </a:t>
             </a:r>
             <a:r>
-              <a:rPr lang="en-US" sz="2000" spc="-50" dirty="0" err="1" smtClean="0">
+              <a:rPr lang="en-US" sz="2000" spc="-50" dirty="0" err="1">
                 <a:solidFill>
                   <a:schemeClr val="accent2">
                     <a:lumMod val="75000"/>
@@ -6211,7 +6073,7 @@
               <a:t>user.email</a:t>
             </a:r>
             <a:r>
-              <a:rPr lang="en-US" sz="2000" spc="-50" dirty="0" smtClean="0">
+              <a:rPr lang="en-US" sz="2000" spc="-50" dirty="0">
                 <a:solidFill>
                   <a:schemeClr val="accent2">
                     <a:lumMod val="75000"/>
@@ -6226,7 +6088,7 @@
           </a:p>
           <a:p>
             <a:pPr lvl="1"/>
-            <a:endParaRPr lang="en-US" sz="2000" spc="-50" dirty="0" smtClean="0">
+            <a:endParaRPr lang="en-US" sz="2000" spc="-50" dirty="0">
               <a:solidFill>
                 <a:schemeClr val="accent2">
                   <a:lumMod val="75000"/>
@@ -6239,7 +6101,7 @@
           <a:p>
             <a:pPr lvl="1"/>
             <a:r>
-              <a:rPr lang="en-US" sz="2000" spc="-50" dirty="0" err="1" smtClean="0">
+              <a:rPr lang="en-US" sz="2000" spc="-50" dirty="0" err="1">
                 <a:solidFill>
                   <a:schemeClr val="accent2">
                     <a:lumMod val="75000"/>
@@ -6251,7 +6113,7 @@
               <a:t>git</a:t>
             </a:r>
             <a:r>
-              <a:rPr lang="en-US" sz="2000" spc="-50" dirty="0" smtClean="0">
+              <a:rPr lang="en-US" sz="2000" spc="-50" dirty="0">
                 <a:solidFill>
                   <a:schemeClr val="accent2">
                     <a:lumMod val="75000"/>
@@ -6284,19 +6146,7 @@
                 <a:latin typeface="Consolas" panose="020B0609020204030204" pitchFamily="49" charset="0"/>
                 <a:cs typeface="Consolas" panose="020B0609020204030204" pitchFamily="49" charset="0"/>
               </a:rPr>
-              <a:t> --global </a:t>
-            </a:r>
-            <a:r>
-              <a:rPr lang="en-US" sz="2000" spc="-50" dirty="0" smtClean="0">
-                <a:solidFill>
-                  <a:schemeClr val="accent2">
-                    <a:lumMod val="75000"/>
-                  </a:schemeClr>
-                </a:solidFill>
-                <a:latin typeface="Consolas" panose="020B0609020204030204" pitchFamily="49" charset="0"/>
-                <a:cs typeface="Consolas" panose="020B0609020204030204" pitchFamily="49" charset="0"/>
-              </a:rPr>
-              <a:t>user.name “username”</a:t>
+              <a:t> --global user.name “username”</a:t>
             </a:r>
             <a:endParaRPr lang="en-US" sz="2000" spc="-50" dirty="0">
               <a:solidFill>
@@ -6329,13 +6179,6 @@
   <p:clrMapOvr>
     <a:masterClrMapping/>
   </p:clrMapOvr>
-  <p:timing>
-    <p:tnLst>
-      <p:par>
-        <p:cTn id="1" dur="indefinite" restart="never" nodeType="tmRoot"/>
-      </p:par>
-    </p:tnLst>
-  </p:timing>
 </p:sld>
 </file>
 
@@ -6468,7 +6311,7 @@
               </a:rPr>
               <a:t>init</a:t>
             </a:r>
-            <a:endParaRPr lang="en-US" sz="2000" spc="-50" dirty="0" smtClean="0">
+            <a:endParaRPr lang="en-US" sz="2000" spc="-50" dirty="0">
               <a:solidFill>
                 <a:schemeClr val="accent2">
                   <a:lumMod val="75000"/>
@@ -6490,20 +6333,12 @@
           <a:p>
             <a:pPr lvl="1"/>
             <a:r>
-              <a:rPr lang="en-US" spc="-50" dirty="0" smtClean="0">
-                <a:latin typeface="+mj-lt"/>
-                <a:ea typeface="+mj-ea"/>
-                <a:cs typeface="+mj-cs"/>
-              </a:rPr>
-              <a:t>To </a:t>
-            </a:r>
-            <a:r>
               <a:rPr lang="en-US" spc="-50" dirty="0">
                 <a:latin typeface="+mj-lt"/>
                 <a:ea typeface="+mj-ea"/>
                 <a:cs typeface="+mj-cs"/>
               </a:rPr>
-              <a:t>create a new repo, you'll use the </a:t>
+              <a:t>To create a new repo, you'll use the </a:t>
             </a:r>
             <a:r>
               <a:rPr lang="en-US" spc="-50" dirty="0" err="1">
@@ -6569,11 +6404,6 @@
               </a:rPr>
               <a:t> is a one-time command you use during the initial setup of a new repo. </a:t>
             </a:r>
-            <a:endParaRPr lang="en-US" spc="-50" dirty="0" smtClean="0">
-              <a:latin typeface="+mj-lt"/>
-              <a:ea typeface="+mj-ea"/>
-              <a:cs typeface="+mj-cs"/>
-            </a:endParaRPr>
           </a:p>
           <a:p>
             <a:pPr lvl="1"/>
@@ -6586,20 +6416,12 @@
           <a:p>
             <a:pPr lvl="1"/>
             <a:r>
-              <a:rPr lang="en-US" spc="-50" dirty="0" smtClean="0">
-                <a:latin typeface="+mj-lt"/>
-                <a:ea typeface="+mj-ea"/>
-                <a:cs typeface="+mj-cs"/>
-              </a:rPr>
-              <a:t>Executing </a:t>
-            </a:r>
-            <a:r>
               <a:rPr lang="en-US" spc="-50" dirty="0">
                 <a:latin typeface="+mj-lt"/>
                 <a:ea typeface="+mj-ea"/>
                 <a:cs typeface="+mj-cs"/>
               </a:rPr>
-              <a:t>this command will create a new .</a:t>
+              <a:t>Executing this command will create a new .</a:t>
             </a:r>
             <a:r>
               <a:rPr lang="en-US" spc="-50" dirty="0" err="1">
@@ -6617,11 +6439,6 @@
               </a:rPr>
               <a:t> subdirectory in your current working directory. This will also create a new master branch. </a:t>
             </a:r>
-            <a:endParaRPr lang="en-US" spc="-50" dirty="0" smtClean="0">
-              <a:latin typeface="+mj-lt"/>
-              <a:ea typeface="+mj-ea"/>
-              <a:cs typeface="+mj-cs"/>
-            </a:endParaRPr>
           </a:p>
           <a:p>
             <a:pPr lvl="1"/>
@@ -6698,13 +6515,6 @@
   <p:clrMapOvr>
     <a:masterClrMapping/>
   </p:clrMapOvr>
-  <p:timing>
-    <p:tnLst>
-      <p:par>
-        <p:cTn id="1" dur="indefinite" restart="never" nodeType="tmRoot"/>
-      </p:par>
-    </p:tnLst>
-  </p:timing>
 </p:sld>
 </file>
 
@@ -6841,28 +6651,12 @@
           <a:p>
             <a:pPr lvl="1"/>
             <a:r>
-              <a:rPr lang="en-US" spc="-50" dirty="0" smtClean="0">
-                <a:latin typeface="+mj-lt"/>
-                <a:ea typeface="+mj-ea"/>
-                <a:cs typeface="+mj-cs"/>
-              </a:rPr>
-              <a:t>If </a:t>
-            </a:r>
-            <a:r>
               <a:rPr lang="en-US" spc="-50" dirty="0">
                 <a:latin typeface="+mj-lt"/>
                 <a:ea typeface="+mj-ea"/>
                 <a:cs typeface="+mj-cs"/>
               </a:rPr>
-              <a:t>a project has already been set up in a central repository, the clone command is the most common way for users to obtain a local development clone</a:t>
-            </a:r>
-            <a:r>
-              <a:rPr lang="en-US" spc="-50" dirty="0" smtClean="0">
-                <a:latin typeface="+mj-lt"/>
-                <a:ea typeface="+mj-ea"/>
-                <a:cs typeface="+mj-cs"/>
-              </a:rPr>
-              <a:t>.</a:t>
+              <a:t>If a project has already been set up in a central repository, the clone command is the most common way for users to obtain a local development clone.</a:t>
             </a:r>
           </a:p>
           <a:p>
@@ -6889,15 +6683,7 @@
                 <a:ea typeface="+mj-ea"/>
                 <a:cs typeface="+mj-cs"/>
               </a:rPr>
-              <a:t> supports a few different network protocols and corresponding URL formats</a:t>
-            </a:r>
-            <a:r>
-              <a:rPr lang="en-US" spc="-50" dirty="0" smtClean="0">
-                <a:latin typeface="+mj-lt"/>
-                <a:ea typeface="+mj-ea"/>
-                <a:cs typeface="+mj-cs"/>
-              </a:rPr>
-              <a:t>.</a:t>
+              <a:t> supports a few different network protocols and corresponding URL formats.</a:t>
             </a:r>
           </a:p>
           <a:p>
@@ -6931,13 +6717,6 @@
   <p:clrMapOvr>
     <a:masterClrMapping/>
   </p:clrMapOvr>
-  <p:timing>
-    <p:tnLst>
-      <p:par>
-        <p:cTn id="1" dur="indefinite" restart="never" nodeType="tmRoot"/>
-      </p:par>
-    </p:tnLst>
-  </p:timing>
 </p:sld>
 </file>
 
@@ -7015,7 +6794,7 @@
           <a:p>
             <a:pPr lvl="1"/>
             <a:r>
-              <a:rPr lang="en-US" sz="2000" spc="-50" dirty="0" smtClean="0">
+              <a:rPr lang="en-US" sz="2000" spc="-50" dirty="0">
                 <a:solidFill>
                   <a:schemeClr val="accent2">
                     <a:lumMod val="75000"/>
@@ -7024,8 +6803,11 @@
                 <a:latin typeface="Consolas" panose="020B0609020204030204" pitchFamily="49" charset="0"/>
                 <a:cs typeface="Consolas" panose="020B0609020204030204" pitchFamily="49" charset="0"/>
               </a:rPr>
-              <a:t>cd </a:t>
-            </a:r>
+              <a:t>cd /path/to/project</a:t>
+            </a:r>
+          </a:p>
+          <a:p>
+            <a:pPr lvl="1"/>
             <a:r>
               <a:rPr lang="en-US" sz="2000" spc="-50" dirty="0">
                 <a:solidFill>
@@ -7036,13 +6818,10 @@
                 <a:latin typeface="Consolas" panose="020B0609020204030204" pitchFamily="49" charset="0"/>
                 <a:cs typeface="Consolas" panose="020B0609020204030204" pitchFamily="49" charset="0"/>
               </a:rPr>
-              <a:t>/path/to/project</a:t>
-            </a:r>
-          </a:p>
-          <a:p>
-            <a:pPr lvl="1"/>
-            <a:r>
-              <a:rPr lang="en-US" sz="2000" spc="-50" dirty="0">
+              <a:t>echo "test content for </a:t>
+            </a:r>
+            <a:r>
+              <a:rPr lang="en-US" sz="2000" spc="-50" dirty="0" err="1">
                 <a:solidFill>
                   <a:schemeClr val="accent2">
                     <a:lumMod val="75000"/>
@@ -7051,10 +6830,10 @@
                 <a:latin typeface="Consolas" panose="020B0609020204030204" pitchFamily="49" charset="0"/>
                 <a:cs typeface="Consolas" panose="020B0609020204030204" pitchFamily="49" charset="0"/>
               </a:rPr>
-              <a:t>echo "test content for </a:t>
-            </a:r>
-            <a:r>
-              <a:rPr lang="en-US" sz="2000" spc="-50" dirty="0" err="1">
+              <a:t>git</a:t>
+            </a:r>
+            <a:r>
+              <a:rPr lang="en-US" sz="2000" spc="-50" dirty="0">
                 <a:solidFill>
                   <a:schemeClr val="accent2">
                     <a:lumMod val="75000"/>
@@ -7063,10 +6842,13 @@
                 <a:latin typeface="Consolas" panose="020B0609020204030204" pitchFamily="49" charset="0"/>
                 <a:cs typeface="Consolas" panose="020B0609020204030204" pitchFamily="49" charset="0"/>
               </a:rPr>
-              <a:t>git</a:t>
-            </a:r>
-            <a:r>
-              <a:rPr lang="en-US" sz="2000" spc="-50" dirty="0">
+              <a:t> tutorial" &gt;&gt; CommitTest.txt</a:t>
+            </a:r>
+          </a:p>
+          <a:p>
+            <a:pPr lvl="1"/>
+            <a:r>
+              <a:rPr lang="en-US" sz="2000" spc="-50" dirty="0" err="1">
                 <a:solidFill>
                   <a:schemeClr val="accent2">
                     <a:lumMod val="75000"/>
@@ -7075,13 +6857,10 @@
                 <a:latin typeface="Consolas" panose="020B0609020204030204" pitchFamily="49" charset="0"/>
                 <a:cs typeface="Consolas" panose="020B0609020204030204" pitchFamily="49" charset="0"/>
               </a:rPr>
-              <a:t> tutorial" &gt;&gt; CommitTest.txt</a:t>
-            </a:r>
-          </a:p>
-          <a:p>
-            <a:pPr lvl="1"/>
-            <a:r>
-              <a:rPr lang="en-US" sz="2000" spc="-50" dirty="0" err="1">
+              <a:t>git</a:t>
+            </a:r>
+            <a:r>
+              <a:rPr lang="en-US" sz="2000" spc="-50" dirty="0">
                 <a:solidFill>
                   <a:schemeClr val="accent2">
                     <a:lumMod val="75000"/>
@@ -7090,10 +6869,13 @@
                 <a:latin typeface="Consolas" panose="020B0609020204030204" pitchFamily="49" charset="0"/>
                 <a:cs typeface="Consolas" panose="020B0609020204030204" pitchFamily="49" charset="0"/>
               </a:rPr>
-              <a:t>git</a:t>
-            </a:r>
-            <a:r>
-              <a:rPr lang="en-US" sz="2000" spc="-50" dirty="0">
+              <a:t> add CommitTest.txt</a:t>
+            </a:r>
+          </a:p>
+          <a:p>
+            <a:pPr lvl="1"/>
+            <a:r>
+              <a:rPr lang="en-US" sz="2000" spc="-50" dirty="0" err="1">
                 <a:solidFill>
                   <a:schemeClr val="accent2">
                     <a:lumMod val="75000"/>
@@ -7102,13 +6884,10 @@
                 <a:latin typeface="Consolas" panose="020B0609020204030204" pitchFamily="49" charset="0"/>
                 <a:cs typeface="Consolas" panose="020B0609020204030204" pitchFamily="49" charset="0"/>
               </a:rPr>
-              <a:t> add CommitTest.txt</a:t>
-            </a:r>
-          </a:p>
-          <a:p>
-            <a:pPr lvl="1"/>
-            <a:r>
-              <a:rPr lang="en-US" sz="2000" spc="-50" dirty="0" err="1">
+              <a:t>git</a:t>
+            </a:r>
+            <a:r>
+              <a:rPr lang="en-US" sz="2000" spc="-50" dirty="0">
                 <a:solidFill>
                   <a:schemeClr val="accent2">
                     <a:lumMod val="75000"/>
@@ -7117,31 +6896,7 @@
                 <a:latin typeface="Consolas" panose="020B0609020204030204" pitchFamily="49" charset="0"/>
                 <a:cs typeface="Consolas" panose="020B0609020204030204" pitchFamily="49" charset="0"/>
               </a:rPr>
-              <a:t>git</a:t>
-            </a:r>
-            <a:r>
-              <a:rPr lang="en-US" sz="2000" spc="-50" dirty="0">
-                <a:solidFill>
-                  <a:schemeClr val="accent2">
-                    <a:lumMod val="75000"/>
-                  </a:schemeClr>
-                </a:solidFill>
-                <a:latin typeface="Consolas" panose="020B0609020204030204" pitchFamily="49" charset="0"/>
-                <a:cs typeface="Consolas" panose="020B0609020204030204" pitchFamily="49" charset="0"/>
-              </a:rPr>
-              <a:t> commit -m "added CommitTest.txt to the repo</a:t>
-            </a:r>
-            <a:r>
-              <a:rPr lang="en-US" sz="2000" spc="-50" dirty="0" smtClean="0">
-                <a:solidFill>
-                  <a:schemeClr val="accent2">
-                    <a:lumMod val="75000"/>
-                  </a:schemeClr>
-                </a:solidFill>
-                <a:latin typeface="Consolas" panose="020B0609020204030204" pitchFamily="49" charset="0"/>
-                <a:cs typeface="Consolas" panose="020B0609020204030204" pitchFamily="49" charset="0"/>
-              </a:rPr>
-              <a:t>"</a:t>
+              <a:t> commit -m "added CommitTest.txt to the repo"</a:t>
             </a:r>
             <a:endParaRPr lang="en-US" sz="2000" spc="-50" dirty="0">
               <a:solidFill>
@@ -7153,53 +6908,6 @@
               <a:ea typeface="+mj-ea"/>
               <a:cs typeface="Consolas" panose="020B0609020204030204" pitchFamily="49" charset="0"/>
             </a:endParaRPr>
-          </a:p>
-          <a:p>
-            <a:pPr lvl="1">
-              <a:buClr>
-                <a:srgbClr val="1CADE4"/>
-              </a:buClr>
-            </a:pPr>
-            <a:endParaRPr lang="en-US" spc="-50" dirty="0" smtClean="0">
-              <a:solidFill>
-                <a:prstClr val="black">
-                  <a:lumMod val="75000"/>
-                  <a:lumOff val="25000"/>
-                </a:prstClr>
-              </a:solidFill>
-              <a:latin typeface="Calibri Light" panose="020F0302020204030204"/>
-            </a:endParaRPr>
-          </a:p>
-          <a:p>
-            <a:pPr lvl="1">
-              <a:buClr>
-                <a:srgbClr val="1CADE4"/>
-              </a:buClr>
-            </a:pPr>
-            <a:r>
-              <a:rPr lang="en-US" spc="-50" dirty="0">
-                <a:solidFill>
-                  <a:prstClr val="black">
-                    <a:lumMod val="75000"/>
-                    <a:lumOff val="25000"/>
-                  </a:prstClr>
-                </a:solidFill>
-                <a:latin typeface="Calibri Light" panose="020F0302020204030204"/>
-              </a:rPr>
-              <a:t>After executing this example, your repo will now have CommitTest.txt added to the history and will track future updates to the file</a:t>
-            </a:r>
-            <a:r>
-              <a:rPr lang="en-US" spc="-50" dirty="0" smtClean="0">
-                <a:solidFill>
-                  <a:prstClr val="black">
-                    <a:lumMod val="75000"/>
-                    <a:lumOff val="25000"/>
-                  </a:prstClr>
-                </a:solidFill>
-                <a:latin typeface="Calibri Light" panose="020F0302020204030204"/>
-              </a:rPr>
-              <a:t>.</a:t>
-            </a:r>
           </a:p>
           <a:p>
             <a:pPr lvl="1">
@@ -7233,6 +6941,41 @@
                 </a:solidFill>
                 <a:latin typeface="Calibri Light" panose="020F0302020204030204"/>
               </a:rPr>
+              <a:t>After executing this example, your repo will now have CommitTest.txt added to the history and will track future updates to the file.</a:t>
+            </a:r>
+          </a:p>
+          <a:p>
+            <a:pPr lvl="1">
+              <a:buClr>
+                <a:srgbClr val="1CADE4"/>
+              </a:buClr>
+            </a:pPr>
+            <a:endParaRPr lang="en-US" spc="-50" dirty="0">
+              <a:solidFill>
+                <a:prstClr val="black">
+                  <a:lumMod val="75000"/>
+                  <a:lumOff val="25000"/>
+                </a:prstClr>
+              </a:solidFill>
+              <a:latin typeface="Calibri Light" panose="020F0302020204030204"/>
+            </a:endParaRPr>
+          </a:p>
+          <a:p>
+            <a:pPr lvl="1">
+              <a:buClr>
+                <a:srgbClr val="1CADE4"/>
+              </a:buClr>
+            </a:pPr>
+            <a:r>
+              <a:rPr lang="en-US" spc="-50" dirty="0">
+                <a:solidFill>
+                  <a:prstClr val="black">
+                    <a:lumMod val="75000"/>
+                    <a:lumOff val="25000"/>
+                  </a:prstClr>
+                </a:solidFill>
+                <a:latin typeface="Calibri Light" panose="020F0302020204030204"/>
+              </a:rPr>
               <a:t>Another common use case for </a:t>
             </a:r>
             <a:r>
@@ -7304,13 +7047,6 @@
   <p:clrMapOvr>
     <a:masterClrMapping/>
   </p:clrMapOvr>
-  <p:timing>
-    <p:tnLst>
-      <p:par>
-        <p:cTn id="1" dur="indefinite" restart="never" nodeType="tmRoot"/>
-      </p:par>
-    </p:tnLst>
-  </p:timing>
 </p:sld>
 </file>
 
@@ -7396,7 +7132,10 @@
               </a:rPr>
               <a:t> clone in the previous "Initializing a new Repository" section to set up your local repository, your repository is already configured for remote collaboration. </a:t>
             </a:r>
-            <a:endParaRPr lang="en-US" spc="-50" dirty="0" smtClean="0">
+          </a:p>
+          <a:p>
+            <a:pPr lvl="1"/>
+            <a:endParaRPr lang="en-US" spc="-50" dirty="0">
               <a:latin typeface="+mj-lt"/>
               <a:ea typeface="+mj-ea"/>
               <a:cs typeface="+mj-cs"/>
@@ -7404,7 +7143,58 @@
           </a:p>
           <a:p>
             <a:pPr lvl="1"/>
-            <a:endParaRPr lang="en-US" spc="-50" dirty="0" smtClean="0">
+            <a:r>
+              <a:rPr lang="en-US" spc="-50" dirty="0" err="1">
+                <a:latin typeface="+mj-lt"/>
+                <a:ea typeface="+mj-ea"/>
+                <a:cs typeface="+mj-cs"/>
+              </a:rPr>
+              <a:t>git</a:t>
+            </a:r>
+            <a:r>
+              <a:rPr lang="en-US" spc="-50" dirty="0">
+                <a:latin typeface="+mj-lt"/>
+                <a:ea typeface="+mj-ea"/>
+                <a:cs typeface="+mj-cs"/>
+              </a:rPr>
+              <a:t> clone will automatically configure your repo with a remote pointed to the </a:t>
+            </a:r>
+            <a:r>
+              <a:rPr lang="en-US" spc="-50" dirty="0" err="1">
+                <a:latin typeface="+mj-lt"/>
+                <a:ea typeface="+mj-ea"/>
+                <a:cs typeface="+mj-cs"/>
+              </a:rPr>
+              <a:t>Git</a:t>
+            </a:r>
+            <a:r>
+              <a:rPr lang="en-US" spc="-50" dirty="0">
+                <a:latin typeface="+mj-lt"/>
+                <a:ea typeface="+mj-ea"/>
+                <a:cs typeface="+mj-cs"/>
+              </a:rPr>
+              <a:t> URL you cloned it from. This means that once you make changes to a file and commit them, you can </a:t>
+            </a:r>
+            <a:r>
+              <a:rPr lang="en-US" spc="-50" dirty="0" err="1">
+                <a:latin typeface="+mj-lt"/>
+                <a:ea typeface="+mj-ea"/>
+                <a:cs typeface="+mj-cs"/>
+              </a:rPr>
+              <a:t>git</a:t>
+            </a:r>
+            <a:r>
+              <a:rPr lang="en-US" spc="-50" dirty="0">
+                <a:latin typeface="+mj-lt"/>
+                <a:ea typeface="+mj-ea"/>
+                <a:cs typeface="+mj-cs"/>
+              </a:rPr>
+              <a:t> push those changes to the remote repository.</a:t>
+            </a:r>
+          </a:p>
+          <a:p>
+            <a:pPr lvl="1"/>
+            <a:endParaRPr lang="en-US" spc="-50" dirty="0">
               <a:latin typeface="+mj-lt"/>
               <a:ea typeface="+mj-ea"/>
               <a:cs typeface="+mj-cs"/>
@@ -7413,7 +7203,15 @@
           <a:p>
             <a:pPr lvl="1"/>
             <a:r>
-              <a:rPr lang="en-US" spc="-50" dirty="0" err="1" smtClean="0">
+              <a:rPr lang="en-US" spc="-50" dirty="0">
+                <a:latin typeface="+mj-lt"/>
+                <a:ea typeface="+mj-ea"/>
+                <a:cs typeface="+mj-cs"/>
+              </a:rPr>
+              <a:t>If you used </a:t>
+            </a:r>
+            <a:r>
+              <a:rPr lang="en-US" spc="-50" dirty="0" err="1">
                 <a:latin typeface="+mj-lt"/>
                 <a:ea typeface="+mj-ea"/>
                 <a:cs typeface="+mj-cs"/>
@@ -7421,7 +7219,7 @@
               <a:t>git</a:t>
             </a:r>
             <a:r>
-              <a:rPr lang="en-US" spc="-50" dirty="0" smtClean="0">
+              <a:rPr lang="en-US" spc="-50" dirty="0">
                 <a:latin typeface="+mj-lt"/>
                 <a:ea typeface="+mj-ea"/>
                 <a:cs typeface="+mj-cs"/>
@@ -7429,12 +7227,20 @@
               <a:t> </a:t>
             </a:r>
             <a:r>
+              <a:rPr lang="en-US" spc="-50" dirty="0" err="1">
+                <a:latin typeface="+mj-lt"/>
+                <a:ea typeface="+mj-ea"/>
+                <a:cs typeface="+mj-cs"/>
+              </a:rPr>
+              <a:t>init</a:t>
+            </a:r>
+            <a:r>
               <a:rPr lang="en-US" spc="-50" dirty="0">
                 <a:latin typeface="+mj-lt"/>
                 <a:ea typeface="+mj-ea"/>
                 <a:cs typeface="+mj-cs"/>
               </a:rPr>
-              <a:t>clone will automatically configure your repo with a remote pointed to the </a:t>
+              <a:t> to make a fresh repo, you'll have no remote repo to push changes to. A common pattern when initializing a new repo is to go to a hosted </a:t>
             </a:r>
             <a:r>
               <a:rPr lang="en-US" spc="-50" dirty="0" err="1">
@@ -7450,106 +7256,7 @@
                 <a:ea typeface="+mj-ea"/>
                 <a:cs typeface="+mj-cs"/>
               </a:rPr>
-              <a:t> URL you cloned it from. This means that once you make changes to a file and commit them, you can </a:t>
-            </a:r>
-            <a:r>
-              <a:rPr lang="en-US" spc="-50" dirty="0" err="1">
-                <a:latin typeface="+mj-lt"/>
-                <a:ea typeface="+mj-ea"/>
-                <a:cs typeface="+mj-cs"/>
-              </a:rPr>
-              <a:t>git</a:t>
-            </a:r>
-            <a:r>
-              <a:rPr lang="en-US" spc="-50" dirty="0">
-                <a:latin typeface="+mj-lt"/>
-                <a:ea typeface="+mj-ea"/>
-                <a:cs typeface="+mj-cs"/>
-              </a:rPr>
-              <a:t> push those changes to the remote repository.</a:t>
-            </a:r>
-          </a:p>
-          <a:p>
-            <a:pPr lvl="1"/>
-            <a:endParaRPr lang="en-US" spc="-50" dirty="0" smtClean="0">
-              <a:latin typeface="+mj-lt"/>
-              <a:ea typeface="+mj-ea"/>
-              <a:cs typeface="+mj-cs"/>
-            </a:endParaRPr>
-          </a:p>
-          <a:p>
-            <a:pPr lvl="1"/>
-            <a:r>
-              <a:rPr lang="en-US" spc="-50" dirty="0">
-                <a:latin typeface="+mj-lt"/>
-                <a:ea typeface="+mj-ea"/>
-                <a:cs typeface="+mj-cs"/>
-              </a:rPr>
-              <a:t>If you used </a:t>
-            </a:r>
-            <a:r>
-              <a:rPr lang="en-US" spc="-50" dirty="0" err="1">
-                <a:latin typeface="+mj-lt"/>
-                <a:ea typeface="+mj-ea"/>
-                <a:cs typeface="+mj-cs"/>
-              </a:rPr>
-              <a:t>git</a:t>
-            </a:r>
-            <a:r>
-              <a:rPr lang="en-US" spc="-50" dirty="0">
-                <a:latin typeface="+mj-lt"/>
-                <a:ea typeface="+mj-ea"/>
-                <a:cs typeface="+mj-cs"/>
-              </a:rPr>
-              <a:t> </a:t>
-            </a:r>
-            <a:r>
-              <a:rPr lang="en-US" spc="-50" dirty="0" err="1">
-                <a:latin typeface="+mj-lt"/>
-                <a:ea typeface="+mj-ea"/>
-                <a:cs typeface="+mj-cs"/>
-              </a:rPr>
-              <a:t>init</a:t>
-            </a:r>
-            <a:r>
-              <a:rPr lang="en-US" spc="-50" dirty="0">
-                <a:latin typeface="+mj-lt"/>
-                <a:ea typeface="+mj-ea"/>
-                <a:cs typeface="+mj-cs"/>
-              </a:rPr>
-              <a:t> to make a fresh repo, you'll have no remote repo to push changes to. A common pattern when initializing a new repo is to go to a hosted </a:t>
-            </a:r>
-            <a:r>
-              <a:rPr lang="en-US" spc="-50" dirty="0" err="1">
-                <a:latin typeface="+mj-lt"/>
-                <a:ea typeface="+mj-ea"/>
-                <a:cs typeface="+mj-cs"/>
-              </a:rPr>
-              <a:t>Git</a:t>
-            </a:r>
-            <a:r>
-              <a:rPr lang="en-US" spc="-50" dirty="0">
-                <a:latin typeface="+mj-lt"/>
-                <a:ea typeface="+mj-ea"/>
-                <a:cs typeface="+mj-cs"/>
-              </a:rPr>
-              <a:t> service like </a:t>
-            </a:r>
-            <a:r>
-              <a:rPr lang="en-US" spc="-50" dirty="0" smtClean="0">
-                <a:latin typeface="+mj-lt"/>
-                <a:ea typeface="+mj-ea"/>
-                <a:cs typeface="+mj-cs"/>
-              </a:rPr>
-              <a:t>GitHub </a:t>
-            </a:r>
-            <a:r>
-              <a:rPr lang="en-US" spc="-50" dirty="0">
-                <a:latin typeface="+mj-lt"/>
-                <a:ea typeface="+mj-ea"/>
-                <a:cs typeface="+mj-cs"/>
-              </a:rPr>
-              <a:t>and create a repo there. The service will provide a </a:t>
+              <a:t> service like GitHub and create a repo there. The service will provide a </a:t>
             </a:r>
             <a:r>
               <a:rPr lang="en-US" spc="-50" dirty="0" err="1">
@@ -7612,13 +7319,6 @@
   <p:clrMapOvr>
     <a:masterClrMapping/>
   </p:clrMapOvr>
-  <p:timing>
-    <p:tnLst>
-      <p:par>
-        <p:cTn id="1" dur="indefinite" restart="never" nodeType="tmRoot"/>
-      </p:par>
-    </p:tnLst>
-  </p:timing>
 </p:sld>
 </file>
 

</xml_diff>